<commit_message>
New changes made on PDF, tableau and pptx
</commit_message>
<xml_diff>
--- a/Aircraft_lowest_Risk_Analysis_Presentation_Template.pptx
+++ b/Aircraft_lowest_Risk_Analysis_Presentation_Template.pptx
@@ -941,7 +941,7 @@
           <a:p>
             <a:fld id="{5BCAD085-E8A6-8845-BD4E-CB4CCA059FC4}" type="datetimeFigureOut">
               <a:rPr lang="en-US" smtClean="0"/>
-              <a:t>12/20/2025</a:t>
+              <a:t>12/21/2025</a:t>
             </a:fld>
             <a:endParaRPr lang="en-US"/>
           </a:p>
@@ -1264,7 +1264,7 @@
           <a:p>
             <a:fld id="{5BCAD085-E8A6-8845-BD4E-CB4CCA059FC4}" type="datetimeFigureOut">
               <a:rPr lang="en-US" smtClean="0"/>
-              <a:t>12/20/2025</a:t>
+              <a:t>12/21/2025</a:t>
             </a:fld>
             <a:endParaRPr lang="en-US"/>
           </a:p>
@@ -1578,7 +1578,7 @@
           <a:p>
             <a:fld id="{5BCAD085-E8A6-8845-BD4E-CB4CCA059FC4}" type="datetimeFigureOut">
               <a:rPr lang="en-US" smtClean="0"/>
-              <a:t>12/20/2025</a:t>
+              <a:t>12/21/2025</a:t>
             </a:fld>
             <a:endParaRPr lang="en-US"/>
           </a:p>
@@ -1911,7 +1911,7 @@
           <a:p>
             <a:fld id="{5BCAD085-E8A6-8845-BD4E-CB4CCA059FC4}" type="datetimeFigureOut">
               <a:rPr lang="en-US" smtClean="0"/>
-              <a:t>12/20/2025</a:t>
+              <a:t>12/21/2025</a:t>
             </a:fld>
             <a:endParaRPr lang="en-US"/>
           </a:p>
@@ -2225,7 +2225,7 @@
           <a:p>
             <a:fld id="{5BCAD085-E8A6-8845-BD4E-CB4CCA059FC4}" type="datetimeFigureOut">
               <a:rPr lang="en-US" smtClean="0"/>
-              <a:t>12/20/2025</a:t>
+              <a:t>12/21/2025</a:t>
             </a:fld>
             <a:endParaRPr lang="en-US"/>
           </a:p>
@@ -2618,7 +2618,7 @@
           <a:p>
             <a:fld id="{5BCAD085-E8A6-8845-BD4E-CB4CCA059FC4}" type="datetimeFigureOut">
               <a:rPr lang="en-US" smtClean="0"/>
-              <a:t>12/20/2025</a:t>
+              <a:t>12/21/2025</a:t>
             </a:fld>
             <a:endParaRPr lang="en-US"/>
           </a:p>
@@ -2788,7 +2788,7 @@
           <a:p>
             <a:fld id="{5BCAD085-E8A6-8845-BD4E-CB4CCA059FC4}" type="datetimeFigureOut">
               <a:rPr lang="en-US" smtClean="0"/>
-              <a:t>12/20/2025</a:t>
+              <a:t>12/21/2025</a:t>
             </a:fld>
             <a:endParaRPr lang="en-US"/>
           </a:p>
@@ -2968,7 +2968,7 @@
           <a:p>
             <a:fld id="{5BCAD085-E8A6-8845-BD4E-CB4CCA059FC4}" type="datetimeFigureOut">
               <a:rPr lang="en-US" smtClean="0"/>
-              <a:t>12/20/2025</a:t>
+              <a:t>12/21/2025</a:t>
             </a:fld>
             <a:endParaRPr lang="en-US"/>
           </a:p>
@@ -3138,7 +3138,7 @@
           <a:p>
             <a:fld id="{5BCAD085-E8A6-8845-BD4E-CB4CCA059FC4}" type="datetimeFigureOut">
               <a:rPr lang="en-US" smtClean="0"/>
-              <a:t>12/20/2025</a:t>
+              <a:t>12/21/2025</a:t>
             </a:fld>
             <a:endParaRPr lang="en-US"/>
           </a:p>
@@ -3385,7 +3385,7 @@
           <a:p>
             <a:fld id="{5BCAD085-E8A6-8845-BD4E-CB4CCA059FC4}" type="datetimeFigureOut">
               <a:rPr lang="en-US" smtClean="0"/>
-              <a:t>12/20/2025</a:t>
+              <a:t>12/21/2025</a:t>
             </a:fld>
             <a:endParaRPr lang="en-US"/>
           </a:p>
@@ -3682,7 +3682,7 @@
           <a:p>
             <a:fld id="{5BCAD085-E8A6-8845-BD4E-CB4CCA059FC4}" type="datetimeFigureOut">
               <a:rPr lang="en-US" smtClean="0"/>
-              <a:t>12/20/2025</a:t>
+              <a:t>12/21/2025</a:t>
             </a:fld>
             <a:endParaRPr lang="en-US"/>
           </a:p>
@@ -4061,7 +4061,7 @@
           <a:p>
             <a:fld id="{5BCAD085-E8A6-8845-BD4E-CB4CCA059FC4}" type="datetimeFigureOut">
               <a:rPr lang="en-US" smtClean="0"/>
-              <a:t>12/20/2025</a:t>
+              <a:t>12/21/2025</a:t>
             </a:fld>
             <a:endParaRPr lang="en-US"/>
           </a:p>
@@ -4184,7 +4184,7 @@
           <a:p>
             <a:fld id="{5BCAD085-E8A6-8845-BD4E-CB4CCA059FC4}" type="datetimeFigureOut">
               <a:rPr lang="en-US" smtClean="0"/>
-              <a:t>12/20/2025</a:t>
+              <a:t>12/21/2025</a:t>
             </a:fld>
             <a:endParaRPr lang="en-US"/>
           </a:p>
@@ -4279,7 +4279,7 @@
           <a:p>
             <a:fld id="{5BCAD085-E8A6-8845-BD4E-CB4CCA059FC4}" type="datetimeFigureOut">
               <a:rPr lang="en-US" smtClean="0"/>
-              <a:t>12/20/2025</a:t>
+              <a:t>12/21/2025</a:t>
             </a:fld>
             <a:endParaRPr lang="en-US"/>
           </a:p>
@@ -4534,7 +4534,7 @@
           <a:p>
             <a:fld id="{5BCAD085-E8A6-8845-BD4E-CB4CCA059FC4}" type="datetimeFigureOut">
               <a:rPr lang="en-US" smtClean="0"/>
-              <a:t>12/20/2025</a:t>
+              <a:t>12/21/2025</a:t>
             </a:fld>
             <a:endParaRPr lang="en-US"/>
           </a:p>
@@ -4797,7 +4797,7 @@
           <a:p>
             <a:fld id="{5BCAD085-E8A6-8845-BD4E-CB4CCA059FC4}" type="datetimeFigureOut">
               <a:rPr lang="en-US" smtClean="0"/>
-              <a:t>12/20/2025</a:t>
+              <a:t>12/21/2025</a:t>
             </a:fld>
             <a:endParaRPr lang="en-US"/>
           </a:p>
@@ -5617,7 +5617,7 @@
           <a:p>
             <a:fld id="{5BCAD085-E8A6-8845-BD4E-CB4CCA059FC4}" type="datetimeFigureOut">
               <a:rPr lang="en-US" smtClean="0"/>
-              <a:t>12/20/2025</a:t>
+              <a:t>12/21/2025</a:t>
             </a:fld>
             <a:endParaRPr lang="en-US"/>
           </a:p>
@@ -8493,7 +8493,7 @@
           <a:p>
             <a:r>
               <a:rPr lang="en-US" sz="1400" dirty="0"/>
-              <a:t>https://public.tableau.com/views/Book4_17661000027750/finalDB?:language=en-US&amp;publish=yes&amp;:sid=&amp;:redirect=auth&amp;:display_count=n&amp;:origin=viz_share_link</a:t>
+              <a:t>https://public.tableau.com/views/Air_Craft_final_project/Dashboard1?:language=en-US&amp;:sid=&amp;:redirect=auth&amp;:display_count=n&amp;:origin=viz_share_link</a:t>
             </a:r>
           </a:p>
         </p:txBody>

</xml_diff>